<commit_message>
B to B Connectorという記載を Board to Boardに修正
</commit_message>
<xml_diff>
--- a/images/BlockDiagram.pptx
+++ b/images/BlockDiagram.pptx
@@ -259,7 +259,7 @@
           <a:p>
             <a:fld id="{C284373C-AE3C-4775-A8C9-66950A6586CC}" type="datetimeFigureOut">
               <a:rPr kumimoji="1" lang="ja-JP" altLang="en-US" smtClean="0"/>
-              <a:t>2021/10/28</a:t>
+              <a:t>2021/11/29</a:t>
             </a:fld>
             <a:endParaRPr kumimoji="1" lang="ja-JP" altLang="en-US"/>
           </a:p>
@@ -489,7 +489,7 @@
           <a:p>
             <a:fld id="{C284373C-AE3C-4775-A8C9-66950A6586CC}" type="datetimeFigureOut">
               <a:rPr kumimoji="1" lang="ja-JP" altLang="en-US" smtClean="0"/>
-              <a:t>2021/10/28</a:t>
+              <a:t>2021/11/29</a:t>
             </a:fld>
             <a:endParaRPr kumimoji="1" lang="ja-JP" altLang="en-US"/>
           </a:p>
@@ -729,7 +729,7 @@
           <a:p>
             <a:fld id="{C284373C-AE3C-4775-A8C9-66950A6586CC}" type="datetimeFigureOut">
               <a:rPr kumimoji="1" lang="ja-JP" altLang="en-US" smtClean="0"/>
-              <a:t>2021/10/28</a:t>
+              <a:t>2021/11/29</a:t>
             </a:fld>
             <a:endParaRPr kumimoji="1" lang="ja-JP" altLang="en-US"/>
           </a:p>
@@ -959,7 +959,7 @@
           <a:p>
             <a:fld id="{C284373C-AE3C-4775-A8C9-66950A6586CC}" type="datetimeFigureOut">
               <a:rPr kumimoji="1" lang="ja-JP" altLang="en-US" smtClean="0"/>
-              <a:t>2021/10/28</a:t>
+              <a:t>2021/11/29</a:t>
             </a:fld>
             <a:endParaRPr kumimoji="1" lang="ja-JP" altLang="en-US"/>
           </a:p>
@@ -1234,7 +1234,7 @@
           <a:p>
             <a:fld id="{C284373C-AE3C-4775-A8C9-66950A6586CC}" type="datetimeFigureOut">
               <a:rPr kumimoji="1" lang="ja-JP" altLang="en-US" smtClean="0"/>
-              <a:t>2021/10/28</a:t>
+              <a:t>2021/11/29</a:t>
             </a:fld>
             <a:endParaRPr kumimoji="1" lang="ja-JP" altLang="en-US"/>
           </a:p>
@@ -1563,7 +1563,7 @@
           <a:p>
             <a:fld id="{C284373C-AE3C-4775-A8C9-66950A6586CC}" type="datetimeFigureOut">
               <a:rPr kumimoji="1" lang="ja-JP" altLang="en-US" smtClean="0"/>
-              <a:t>2021/10/28</a:t>
+              <a:t>2021/11/29</a:t>
             </a:fld>
             <a:endParaRPr kumimoji="1" lang="ja-JP" altLang="en-US"/>
           </a:p>
@@ -2039,7 +2039,7 @@
           <a:p>
             <a:fld id="{C284373C-AE3C-4775-A8C9-66950A6586CC}" type="datetimeFigureOut">
               <a:rPr kumimoji="1" lang="ja-JP" altLang="en-US" smtClean="0"/>
-              <a:t>2021/10/28</a:t>
+              <a:t>2021/11/29</a:t>
             </a:fld>
             <a:endParaRPr kumimoji="1" lang="ja-JP" altLang="en-US"/>
           </a:p>
@@ -2180,7 +2180,7 @@
           <a:p>
             <a:fld id="{C284373C-AE3C-4775-A8C9-66950A6586CC}" type="datetimeFigureOut">
               <a:rPr kumimoji="1" lang="ja-JP" altLang="en-US" smtClean="0"/>
-              <a:t>2021/10/28</a:t>
+              <a:t>2021/11/29</a:t>
             </a:fld>
             <a:endParaRPr kumimoji="1" lang="ja-JP" altLang="en-US"/>
           </a:p>
@@ -2293,7 +2293,7 @@
           <a:p>
             <a:fld id="{C284373C-AE3C-4775-A8C9-66950A6586CC}" type="datetimeFigureOut">
               <a:rPr kumimoji="1" lang="ja-JP" altLang="en-US" smtClean="0"/>
-              <a:t>2021/10/28</a:t>
+              <a:t>2021/11/29</a:t>
             </a:fld>
             <a:endParaRPr kumimoji="1" lang="ja-JP" altLang="en-US"/>
           </a:p>
@@ -2636,7 +2636,7 @@
           <a:p>
             <a:fld id="{C284373C-AE3C-4775-A8C9-66950A6586CC}" type="datetimeFigureOut">
               <a:rPr kumimoji="1" lang="ja-JP" altLang="en-US" smtClean="0"/>
-              <a:t>2021/10/28</a:t>
+              <a:t>2021/11/29</a:t>
             </a:fld>
             <a:endParaRPr kumimoji="1" lang="ja-JP" altLang="en-US"/>
           </a:p>
@@ -2924,7 +2924,7 @@
           <a:p>
             <a:fld id="{C284373C-AE3C-4775-A8C9-66950A6586CC}" type="datetimeFigureOut">
               <a:rPr kumimoji="1" lang="ja-JP" altLang="en-US" smtClean="0"/>
-              <a:t>2021/10/28</a:t>
+              <a:t>2021/11/29</a:t>
             </a:fld>
             <a:endParaRPr kumimoji="1" lang="ja-JP" altLang="en-US"/>
           </a:p>
@@ -3197,7 +3197,7 @@
           <a:p>
             <a:fld id="{C284373C-AE3C-4775-A8C9-66950A6586CC}" type="datetimeFigureOut">
               <a:rPr kumimoji="1" lang="ja-JP" altLang="en-US" smtClean="0"/>
-              <a:t>2021/10/28</a:t>
+              <a:t>2021/11/29</a:t>
             </a:fld>
             <a:endParaRPr kumimoji="1" lang="ja-JP" altLang="en-US"/>
           </a:p>
@@ -9506,8 +9506,8 @@
         </p:nvSpPr>
         <p:spPr>
           <a:xfrm rot="16200000">
-            <a:off x="1135969" y="3047356"/>
-            <a:ext cx="1452870" cy="246221"/>
+            <a:off x="910649" y="3028649"/>
+            <a:ext cx="1903510" cy="223138"/>
           </a:xfrm>
           <a:prstGeom prst="rect">
             <a:avLst/>
@@ -9521,13 +9521,13 @@
           <a:lstStyle/>
           <a:p>
             <a:r>
-              <a:rPr kumimoji="1" lang="en-US" altLang="ja-JP" sz="1000" b="1" i="1" dirty="0">
+              <a:rPr kumimoji="1" lang="en-US" altLang="ja-JP" sz="850" b="1" i="1" dirty="0">
                 <a:latin typeface="Meiryo UI" panose="020B0604030504040204" pitchFamily="50" charset="-128"/>
                 <a:ea typeface="Meiryo UI" panose="020B0604030504040204" pitchFamily="50" charset="-128"/>
               </a:rPr>
-              <a:t>B to B Connector</a:t>
-            </a:r>
-            <a:endParaRPr kumimoji="1" lang="ja-JP" altLang="en-US" sz="1600" b="1" i="1" dirty="0">
+              <a:t>Board to Board Connector</a:t>
+            </a:r>
+            <a:endParaRPr kumimoji="1" lang="ja-JP" altLang="en-US" sz="850" b="1" i="1" dirty="0">
               <a:latin typeface="Meiryo UI" panose="020B0604030504040204" pitchFamily="50" charset="-128"/>
               <a:ea typeface="Meiryo UI" panose="020B0604030504040204" pitchFamily="50" charset="-128"/>
             </a:endParaRPr>

</xml_diff>

<commit_message>
はじめに: NOR Flash Memoryの呼称を Technical Reference Manualに合わせ修正
NOR Flash for Configuration and Code Flash Memory -> Configuration Flash Memory
NOR Flash for Data Memory -> Data Store Flash Memory
</commit_message>
<xml_diff>
--- a/images/BlockDiagram.pptx
+++ b/images/BlockDiagram.pptx
@@ -259,7 +259,7 @@
           <a:p>
             <a:fld id="{C284373C-AE3C-4775-A8C9-66950A6586CC}" type="datetimeFigureOut">
               <a:rPr kumimoji="1" lang="ja-JP" altLang="en-US" smtClean="0"/>
-              <a:t>2022/12/5</a:t>
+              <a:t>2023/6/14</a:t>
             </a:fld>
             <a:endParaRPr kumimoji="1" lang="ja-JP" altLang="en-US"/>
           </a:p>
@@ -489,7 +489,7 @@
           <a:p>
             <a:fld id="{C284373C-AE3C-4775-A8C9-66950A6586CC}" type="datetimeFigureOut">
               <a:rPr kumimoji="1" lang="ja-JP" altLang="en-US" smtClean="0"/>
-              <a:t>2022/12/5</a:t>
+              <a:t>2023/6/14</a:t>
             </a:fld>
             <a:endParaRPr kumimoji="1" lang="ja-JP" altLang="en-US"/>
           </a:p>
@@ -729,7 +729,7 @@
           <a:p>
             <a:fld id="{C284373C-AE3C-4775-A8C9-66950A6586CC}" type="datetimeFigureOut">
               <a:rPr kumimoji="1" lang="ja-JP" altLang="en-US" smtClean="0"/>
-              <a:t>2022/12/5</a:t>
+              <a:t>2023/6/14</a:t>
             </a:fld>
             <a:endParaRPr kumimoji="1" lang="ja-JP" altLang="en-US"/>
           </a:p>
@@ -959,7 +959,7 @@
           <a:p>
             <a:fld id="{C284373C-AE3C-4775-A8C9-66950A6586CC}" type="datetimeFigureOut">
               <a:rPr kumimoji="1" lang="ja-JP" altLang="en-US" smtClean="0"/>
-              <a:t>2022/12/5</a:t>
+              <a:t>2023/6/14</a:t>
             </a:fld>
             <a:endParaRPr kumimoji="1" lang="ja-JP" altLang="en-US"/>
           </a:p>
@@ -1234,7 +1234,7 @@
           <a:p>
             <a:fld id="{C284373C-AE3C-4775-A8C9-66950A6586CC}" type="datetimeFigureOut">
               <a:rPr kumimoji="1" lang="ja-JP" altLang="en-US" smtClean="0"/>
-              <a:t>2022/12/5</a:t>
+              <a:t>2023/6/14</a:t>
             </a:fld>
             <a:endParaRPr kumimoji="1" lang="ja-JP" altLang="en-US"/>
           </a:p>
@@ -1563,7 +1563,7 @@
           <a:p>
             <a:fld id="{C284373C-AE3C-4775-A8C9-66950A6586CC}" type="datetimeFigureOut">
               <a:rPr kumimoji="1" lang="ja-JP" altLang="en-US" smtClean="0"/>
-              <a:t>2022/12/5</a:t>
+              <a:t>2023/6/14</a:t>
             </a:fld>
             <a:endParaRPr kumimoji="1" lang="ja-JP" altLang="en-US"/>
           </a:p>
@@ -2039,7 +2039,7 @@
           <a:p>
             <a:fld id="{C284373C-AE3C-4775-A8C9-66950A6586CC}" type="datetimeFigureOut">
               <a:rPr kumimoji="1" lang="ja-JP" altLang="en-US" smtClean="0"/>
-              <a:t>2022/12/5</a:t>
+              <a:t>2023/6/14</a:t>
             </a:fld>
             <a:endParaRPr kumimoji="1" lang="ja-JP" altLang="en-US"/>
           </a:p>
@@ -2180,7 +2180,7 @@
           <a:p>
             <a:fld id="{C284373C-AE3C-4775-A8C9-66950A6586CC}" type="datetimeFigureOut">
               <a:rPr kumimoji="1" lang="ja-JP" altLang="en-US" smtClean="0"/>
-              <a:t>2022/12/5</a:t>
+              <a:t>2023/6/14</a:t>
             </a:fld>
             <a:endParaRPr kumimoji="1" lang="ja-JP" altLang="en-US"/>
           </a:p>
@@ -2293,7 +2293,7 @@
           <a:p>
             <a:fld id="{C284373C-AE3C-4775-A8C9-66950A6586CC}" type="datetimeFigureOut">
               <a:rPr kumimoji="1" lang="ja-JP" altLang="en-US" smtClean="0"/>
-              <a:t>2022/12/5</a:t>
+              <a:t>2023/6/14</a:t>
             </a:fld>
             <a:endParaRPr kumimoji="1" lang="ja-JP" altLang="en-US"/>
           </a:p>
@@ -2636,7 +2636,7 @@
           <a:p>
             <a:fld id="{C284373C-AE3C-4775-A8C9-66950A6586CC}" type="datetimeFigureOut">
               <a:rPr kumimoji="1" lang="ja-JP" altLang="en-US" smtClean="0"/>
-              <a:t>2022/12/5</a:t>
+              <a:t>2023/6/14</a:t>
             </a:fld>
             <a:endParaRPr kumimoji="1" lang="ja-JP" altLang="en-US"/>
           </a:p>
@@ -2924,7 +2924,7 @@
           <a:p>
             <a:fld id="{C284373C-AE3C-4775-A8C9-66950A6586CC}" type="datetimeFigureOut">
               <a:rPr kumimoji="1" lang="ja-JP" altLang="en-US" smtClean="0"/>
-              <a:t>2022/12/5</a:t>
+              <a:t>2023/6/14</a:t>
             </a:fld>
             <a:endParaRPr kumimoji="1" lang="ja-JP" altLang="en-US"/>
           </a:p>
@@ -3197,7 +3197,7 @@
           <a:p>
             <a:fld id="{C284373C-AE3C-4775-A8C9-66950A6586CC}" type="datetimeFigureOut">
               <a:rPr kumimoji="1" lang="ja-JP" altLang="en-US" smtClean="0"/>
-              <a:t>2022/12/5</a:t>
+              <a:t>2023/6/14</a:t>
             </a:fld>
             <a:endParaRPr kumimoji="1" lang="ja-JP" altLang="en-US"/>
           </a:p>
@@ -4239,7 +4239,7 @@
                 <a:latin typeface="メイリオ" panose="020B0604030504040204" pitchFamily="50" charset="-128"/>
                 <a:ea typeface="メイリオ" panose="020B0604030504040204" pitchFamily="50" charset="-128"/>
               </a:rPr>
-              <a:t>NOR</a:t>
+              <a:t>Configuration</a:t>
             </a:r>
           </a:p>
           <a:p>
@@ -4299,7 +4299,7 @@
                 <a:latin typeface="メイリオ" panose="020B0604030504040204" pitchFamily="50" charset="-128"/>
                 <a:ea typeface="メイリオ" panose="020B0604030504040204" pitchFamily="50" charset="-128"/>
               </a:rPr>
-              <a:t>NOR</a:t>
+              <a:t>Configuration</a:t>
             </a:r>
           </a:p>
           <a:p>
@@ -4359,18 +4359,22 @@
                 <a:latin typeface="メイリオ" panose="020B0604030504040204" pitchFamily="50" charset="-128"/>
                 <a:ea typeface="メイリオ" panose="020B0604030504040204" pitchFamily="50" charset="-128"/>
               </a:rPr>
-              <a:t>NOR </a:t>
-            </a:r>
-            <a:r>
-              <a:rPr kumimoji="1" lang="en-US" altLang="ja-JP" sz="1000" dirty="0">
+              <a:t>Data Store</a:t>
+            </a:r>
+            <a:endParaRPr kumimoji="1" lang="en-US" altLang="ja-JP" sz="1000" dirty="0">
+              <a:latin typeface="メイリオ" panose="020B0604030504040204" pitchFamily="50" charset="-128"/>
+              <a:ea typeface="メイリオ" panose="020B0604030504040204" pitchFamily="50" charset="-128"/>
+            </a:endParaRPr>
+          </a:p>
+          <a:p>
+            <a:pPr algn="ctr"/>
+            <a:r>
+              <a:rPr lang="en-US" altLang="ja-JP" sz="1000" dirty="0">
                 <a:latin typeface="メイリオ" panose="020B0604030504040204" pitchFamily="50" charset="-128"/>
                 <a:ea typeface="メイリオ" panose="020B0604030504040204" pitchFamily="50" charset="-128"/>
               </a:rPr>
-              <a:t>Flash</a:t>
-            </a:r>
-          </a:p>
-          <a:p>
-            <a:pPr algn="ctr"/>
+              <a:t>Flash </a:t>
+            </a:r>
             <a:r>
               <a:rPr kumimoji="1" lang="en-US" altLang="ja-JP" sz="1000" dirty="0">
                 <a:latin typeface="メイリオ" panose="020B0604030504040204" pitchFamily="50" charset="-128"/>
@@ -5908,15 +5912,12 @@
                 <a:latin typeface="メイリオ" panose="020B0604030504040204" pitchFamily="50" charset="-128"/>
                 <a:ea typeface="メイリオ" panose="020B0604030504040204" pitchFamily="50" charset="-128"/>
               </a:rPr>
-              <a:t>NOR </a:t>
-            </a:r>
-            <a:r>
-              <a:rPr kumimoji="1" lang="en-US" altLang="ja-JP" sz="1000" dirty="0">
-                <a:latin typeface="メイリオ" panose="020B0604030504040204" pitchFamily="50" charset="-128"/>
-                <a:ea typeface="メイリオ" panose="020B0604030504040204" pitchFamily="50" charset="-128"/>
-              </a:rPr>
-              <a:t>Flash</a:t>
-            </a:r>
+              <a:t>Data Store</a:t>
+            </a:r>
+            <a:endParaRPr kumimoji="1" lang="en-US" altLang="ja-JP" sz="1000" dirty="0">
+              <a:latin typeface="メイリオ" panose="020B0604030504040204" pitchFamily="50" charset="-128"/>
+              <a:ea typeface="メイリオ" panose="020B0604030504040204" pitchFamily="50" charset="-128"/>
+            </a:endParaRPr>
           </a:p>
           <a:p>
             <a:pPr algn="ctr"/>

</xml_diff>